<commit_message>
Update B.7 Lesson - ASCII Encoding.pptx
</commit_message>
<xml_diff>
--- a/Topic B Programming Introduction/B.7 Lesson - ASCII Encoding.pptx
+++ b/Topic B Programming Introduction/B.7 Lesson - ASCII Encoding.pptx
@@ -17,6 +17,8 @@
     <p:sldId id="265" r:id="rId11"/>
     <p:sldId id="266" r:id="rId12"/>
     <p:sldId id="267" r:id="rId13"/>
+    <p:sldId id="268" r:id="rId14"/>
+    <p:sldId id="269" r:id="rId15"/>
   </p:sldIdLst>
   <p:sldSz cx="9144000" cy="6858000" type="screen4x3"/>
   <p:notesSz cx="6858000" cy="9144000"/>
@@ -254,7 +256,7 @@
           <a:p>
             <a:fld id="{D76BAD53-4B66-4A34-868F-48912594EE05}" type="datetimeFigureOut">
               <a:rPr lang="en-US" smtClean="0"/>
-              <a:t>11/21/2019</a:t>
+              <a:t>11/22/2019</a:t>
             </a:fld>
             <a:endParaRPr lang="en-US"/>
           </a:p>
@@ -424,7 +426,7 @@
           <a:p>
             <a:fld id="{D76BAD53-4B66-4A34-868F-48912594EE05}" type="datetimeFigureOut">
               <a:rPr lang="en-US" smtClean="0"/>
-              <a:t>11/21/2019</a:t>
+              <a:t>11/22/2019</a:t>
             </a:fld>
             <a:endParaRPr lang="en-US"/>
           </a:p>
@@ -604,7 +606,7 @@
           <a:p>
             <a:fld id="{D76BAD53-4B66-4A34-868F-48912594EE05}" type="datetimeFigureOut">
               <a:rPr lang="en-US" smtClean="0"/>
-              <a:t>11/21/2019</a:t>
+              <a:t>11/22/2019</a:t>
             </a:fld>
             <a:endParaRPr lang="en-US"/>
           </a:p>
@@ -774,7 +776,7 @@
           <a:p>
             <a:fld id="{D76BAD53-4B66-4A34-868F-48912594EE05}" type="datetimeFigureOut">
               <a:rPr lang="en-US" smtClean="0"/>
-              <a:t>11/21/2019</a:t>
+              <a:t>11/22/2019</a:t>
             </a:fld>
             <a:endParaRPr lang="en-US"/>
           </a:p>
@@ -1018,7 +1020,7 @@
           <a:p>
             <a:fld id="{D76BAD53-4B66-4A34-868F-48912594EE05}" type="datetimeFigureOut">
               <a:rPr lang="en-US" smtClean="0"/>
-              <a:t>11/21/2019</a:t>
+              <a:t>11/22/2019</a:t>
             </a:fld>
             <a:endParaRPr lang="en-US"/>
           </a:p>
@@ -1250,7 +1252,7 @@
           <a:p>
             <a:fld id="{D76BAD53-4B66-4A34-868F-48912594EE05}" type="datetimeFigureOut">
               <a:rPr lang="en-US" smtClean="0"/>
-              <a:t>11/21/2019</a:t>
+              <a:t>11/22/2019</a:t>
             </a:fld>
             <a:endParaRPr lang="en-US"/>
           </a:p>
@@ -1617,7 +1619,7 @@
           <a:p>
             <a:fld id="{D76BAD53-4B66-4A34-868F-48912594EE05}" type="datetimeFigureOut">
               <a:rPr lang="en-US" smtClean="0"/>
-              <a:t>11/21/2019</a:t>
+              <a:t>11/22/2019</a:t>
             </a:fld>
             <a:endParaRPr lang="en-US"/>
           </a:p>
@@ -1735,7 +1737,7 @@
           <a:p>
             <a:fld id="{D76BAD53-4B66-4A34-868F-48912594EE05}" type="datetimeFigureOut">
               <a:rPr lang="en-US" smtClean="0"/>
-              <a:t>11/21/2019</a:t>
+              <a:t>11/22/2019</a:t>
             </a:fld>
             <a:endParaRPr lang="en-US"/>
           </a:p>
@@ -1830,7 +1832,7 @@
           <a:p>
             <a:fld id="{D76BAD53-4B66-4A34-868F-48912594EE05}" type="datetimeFigureOut">
               <a:rPr lang="en-US" smtClean="0"/>
-              <a:t>11/21/2019</a:t>
+              <a:t>11/22/2019</a:t>
             </a:fld>
             <a:endParaRPr lang="en-US"/>
           </a:p>
@@ -2107,7 +2109,7 @@
           <a:p>
             <a:fld id="{D76BAD53-4B66-4A34-868F-48912594EE05}" type="datetimeFigureOut">
               <a:rPr lang="en-US" smtClean="0"/>
-              <a:t>11/21/2019</a:t>
+              <a:t>11/22/2019</a:t>
             </a:fld>
             <a:endParaRPr lang="en-US"/>
           </a:p>
@@ -2364,7 +2366,7 @@
           <a:p>
             <a:fld id="{D76BAD53-4B66-4A34-868F-48912594EE05}" type="datetimeFigureOut">
               <a:rPr lang="en-US" smtClean="0"/>
-              <a:t>11/21/2019</a:t>
+              <a:t>11/22/2019</a:t>
             </a:fld>
             <a:endParaRPr lang="en-US"/>
           </a:p>
@@ -2577,7 +2579,7 @@
           <a:p>
             <a:fld id="{D76BAD53-4B66-4A34-868F-48912594EE05}" type="datetimeFigureOut">
               <a:rPr lang="en-US" smtClean="0"/>
-              <a:t>11/21/2019</a:t>
+              <a:t>11/22/2019</a:t>
             </a:fld>
             <a:endParaRPr lang="en-US"/>
           </a:p>
@@ -3119,11 +3121,7 @@
           <a:p>
             <a:r>
               <a:rPr lang="en-CA" dirty="0" smtClean="0"/>
-              <a:t>Google "Unicode</a:t>
-            </a:r>
-            <a:r>
-              <a:rPr lang="en-CA" dirty="0" smtClean="0"/>
-              <a:t>"</a:t>
+              <a:t>Google "Unicode"</a:t>
             </a:r>
           </a:p>
           <a:p>
@@ -3445,6 +3443,167 @@
     <p:extLst>
       <p:ext uri="{BB962C8B-B14F-4D97-AF65-F5344CB8AC3E}">
         <p14:creationId xmlns:p14="http://schemas.microsoft.com/office/powerpoint/2010/main" val="1553163522"/>
+      </p:ext>
+    </p:extLst>
+  </p:cSld>
+  <p:clrMapOvr>
+    <a:masterClrMapping/>
+  </p:clrMapOvr>
+</p:sld>
+</file>
+
+<file path=ppt/slides/slide13.xml><?xml version="1.0" encoding="utf-8"?>
+<p:sld xmlns:a="http://schemas.openxmlformats.org/drawingml/2006/main" xmlns:r="http://schemas.openxmlformats.org/officeDocument/2006/relationships" xmlns:p="http://schemas.openxmlformats.org/presentationml/2006/main">
+  <p:cSld>
+    <p:spTree>
+      <p:nvGrpSpPr>
+        <p:cNvPr id="1" name=""/>
+        <p:cNvGrpSpPr/>
+        <p:nvPr/>
+      </p:nvGrpSpPr>
+      <p:grpSpPr>
+        <a:xfrm>
+          <a:off x="0" y="0"/>
+          <a:ext cx="0" cy="0"/>
+          <a:chOff x="0" y="0"/>
+          <a:chExt cx="0" cy="0"/>
+        </a:xfrm>
+      </p:grpSpPr>
+      <p:sp>
+        <p:nvSpPr>
+          <p:cNvPr id="2" name="Title 1"/>
+          <p:cNvSpPr>
+            <a:spLocks noGrp="1"/>
+          </p:cNvSpPr>
+          <p:nvPr>
+            <p:ph type="title"/>
+          </p:nvPr>
+        </p:nvSpPr>
+        <p:spPr/>
+        <p:txBody>
+          <a:bodyPr/>
+          <a:lstStyle/>
+          <a:p>
+            <a:r>
+              <a:rPr lang="en-CA" dirty="0" smtClean="0"/>
+              <a:t>Student Question #5</a:t>
+            </a:r>
+            <a:endParaRPr lang="en-US" dirty="0"/>
+          </a:p>
+        </p:txBody>
+      </p:sp>
+      <p:pic>
+        <p:nvPicPr>
+          <p:cNvPr id="4" name="Picture 3"/>
+          <p:cNvPicPr>
+            <a:picLocks noChangeAspect="1"/>
+          </p:cNvPicPr>
+          <p:nvPr/>
+        </p:nvPicPr>
+        <p:blipFill>
+          <a:blip r:embed="rId2"/>
+          <a:stretch>
+            <a:fillRect/>
+          </a:stretch>
+        </p:blipFill>
+        <p:spPr>
+          <a:xfrm>
+            <a:off x="1030761" y="1690689"/>
+            <a:ext cx="7028125" cy="4136905"/>
+          </a:xfrm>
+          <a:prstGeom prst="rect">
+            <a:avLst/>
+          </a:prstGeom>
+        </p:spPr>
+      </p:pic>
+    </p:spTree>
+    <p:extLst>
+      <p:ext uri="{BB962C8B-B14F-4D97-AF65-F5344CB8AC3E}">
+        <p14:creationId xmlns:p14="http://schemas.microsoft.com/office/powerpoint/2010/main" val="2528758046"/>
+      </p:ext>
+    </p:extLst>
+  </p:cSld>
+  <p:clrMapOvr>
+    <a:masterClrMapping/>
+  </p:clrMapOvr>
+</p:sld>
+</file>
+
+<file path=ppt/slides/slide14.xml><?xml version="1.0" encoding="utf-8"?>
+<p:sld xmlns:a="http://schemas.openxmlformats.org/drawingml/2006/main" xmlns:r="http://schemas.openxmlformats.org/officeDocument/2006/relationships" xmlns:p="http://schemas.openxmlformats.org/presentationml/2006/main">
+  <p:cSld>
+    <p:spTree>
+      <p:nvGrpSpPr>
+        <p:cNvPr id="1" name=""/>
+        <p:cNvGrpSpPr/>
+        <p:nvPr/>
+      </p:nvGrpSpPr>
+      <p:grpSpPr>
+        <a:xfrm>
+          <a:off x="0" y="0"/>
+          <a:ext cx="0" cy="0"/>
+          <a:chOff x="0" y="0"/>
+          <a:chExt cx="0" cy="0"/>
+        </a:xfrm>
+      </p:grpSpPr>
+      <p:sp>
+        <p:nvSpPr>
+          <p:cNvPr id="2" name="Title 1"/>
+          <p:cNvSpPr>
+            <a:spLocks noGrp="1"/>
+          </p:cNvSpPr>
+          <p:nvPr>
+            <p:ph type="title"/>
+          </p:nvPr>
+        </p:nvSpPr>
+        <p:spPr/>
+        <p:txBody>
+          <a:bodyPr/>
+          <a:lstStyle/>
+          <a:p>
+            <a:r>
+              <a:rPr lang="en-CA" dirty="0" smtClean="0"/>
+              <a:t>Student </a:t>
+            </a:r>
+            <a:br>
+              <a:rPr lang="en-CA" dirty="0" smtClean="0"/>
+            </a:br>
+            <a:r>
+              <a:rPr lang="en-CA" dirty="0" smtClean="0"/>
+              <a:t>Question #6</a:t>
+            </a:r>
+            <a:endParaRPr lang="en-US" dirty="0"/>
+          </a:p>
+        </p:txBody>
+      </p:sp>
+      <p:pic>
+        <p:nvPicPr>
+          <p:cNvPr id="3" name="Picture 2"/>
+          <p:cNvPicPr>
+            <a:picLocks noChangeAspect="1"/>
+          </p:cNvPicPr>
+          <p:nvPr/>
+        </p:nvPicPr>
+        <p:blipFill>
+          <a:blip r:embed="rId2"/>
+          <a:stretch>
+            <a:fillRect/>
+          </a:stretch>
+        </p:blipFill>
+        <p:spPr>
+          <a:xfrm>
+            <a:off x="3781425" y="166687"/>
+            <a:ext cx="4733925" cy="6524625"/>
+          </a:xfrm>
+          <a:prstGeom prst="rect">
+            <a:avLst/>
+          </a:prstGeom>
+        </p:spPr>
+      </p:pic>
+    </p:spTree>
+    <p:extLst>
+      <p:ext uri="{BB962C8B-B14F-4D97-AF65-F5344CB8AC3E}">
+        <p14:creationId xmlns:p14="http://schemas.microsoft.com/office/powerpoint/2010/main" val="2247228001"/>
       </p:ext>
     </p:extLst>
   </p:cSld>

</xml_diff>